<commit_message>
Made a couple of minor changes to the Powerpoint. I'm not linking to it because everything in it is in the HTML file.
</commit_message>
<xml_diff>
--- a/lab/lab3/ECE_383_Lab3.pptx
+++ b/lab/lab3/ECE_383_Lab3.pptx
@@ -6,10 +6,10 @@
     <p:sldMasterId id="2147483687" r:id="rId2"/>
   </p:sldMasterIdLst>
   <p:notesMasterIdLst>
-    <p:notesMasterId r:id="rId22"/>
+    <p:notesMasterId r:id="rId20"/>
   </p:notesMasterIdLst>
   <p:handoutMasterIdLst>
-    <p:handoutMasterId r:id="rId23"/>
+    <p:handoutMasterId r:id="rId21"/>
   </p:handoutMasterIdLst>
   <p:sldIdLst>
     <p:sldId id="364" r:id="rId3"/>
@@ -24,13 +24,11 @@
     <p:sldId id="361" r:id="rId12"/>
     <p:sldId id="389" r:id="rId13"/>
     <p:sldId id="390" r:id="rId14"/>
-    <p:sldId id="375" r:id="rId15"/>
-    <p:sldId id="368" r:id="rId16"/>
-    <p:sldId id="369" r:id="rId17"/>
-    <p:sldId id="376" r:id="rId18"/>
-    <p:sldId id="370" r:id="rId19"/>
-    <p:sldId id="380" r:id="rId20"/>
-    <p:sldId id="372" r:id="rId21"/>
+    <p:sldId id="369" r:id="rId15"/>
+    <p:sldId id="376" r:id="rId16"/>
+    <p:sldId id="370" r:id="rId17"/>
+    <p:sldId id="380" r:id="rId18"/>
+    <p:sldId id="372" r:id="rId19"/>
   </p:sldIdLst>
   <p:sldSz cx="9144000" cy="6858000" type="screen4x3"/>
   <p:notesSz cx="6985000" cy="9283700"/>
@@ -9299,7 +9297,15 @@
           <a:p>
             <a:r>
               <a:rPr lang="en-US" b="0" dirty="0"/>
-              <a:t>With the expectation of the following engineering change orders (ECO) in the table below, the hardware you developed in lab2 will be unchanged. For the following ECO, please refer to the high-level architecture in </a:t>
+              <a:t>With the </a:t>
+            </a:r>
+            <a:r>
+              <a:rPr lang="en-US" b="0" dirty="0" smtClean="0"/>
+              <a:t>exception of </a:t>
+            </a:r>
+            <a:r>
+              <a:rPr lang="en-US" b="0" dirty="0"/>
+              <a:t>the following engineering change orders (ECO) in the table below, the hardware you developed in lab2 will be unchanged. For the following ECO, please refer to the high-level architecture in </a:t>
             </a:r>
             <a:r>
               <a:rPr lang="en-US" b="0" dirty="0">
@@ -12283,14 +12289,14 @@
           <a:p>
             <a:r>
               <a:rPr lang="en-US" dirty="0" smtClean="0"/>
-              <a:t>Lab 3 – Requirements </a:t>
+              <a:t>Lab 3 – Requirements</a:t>
             </a:r>
             <a:br>
               <a:rPr lang="en-US" dirty="0" smtClean="0"/>
             </a:br>
             <a:r>
               <a:rPr lang="en-US" dirty="0" smtClean="0"/>
-              <a:t>Gate Check 1</a:t>
+              <a:t>Required Functionality</a:t>
             </a:r>
             <a:endParaRPr lang="en-US" dirty="0"/>
           </a:p>
@@ -12311,14 +12317,69 @@
           <a:bodyPr/>
           <a:lstStyle/>
           <a:p>
-            <a:pPr eaLnBrk="1" hangingPunct="1">
-              <a:lnSpc>
-                <a:spcPct val="80000"/>
-              </a:lnSpc>
-            </a:pPr>
             <a:r>
               <a:rPr lang="en-US" dirty="0"/>
-              <a:t>Gate Checks for Required Functionality</a:t>
+              <a:t>Required Functionality</a:t>
+            </a:r>
+          </a:p>
+          <a:p>
+            <a:pPr lvl="1"/>
+            <a:r>
+              <a:rPr lang="en-US" b="0" dirty="0"/>
+              <a:t>In order to make required functionality you will need to properly trigger the oscilloscope on channel 1 using a positive edge trigger. Control of this process is to be performed using the </a:t>
+            </a:r>
+            <a:r>
+              <a:rPr lang="en-US" b="0" dirty="0" err="1"/>
+              <a:t>MicroBlaze</a:t>
+            </a:r>
+            <a:r>
+              <a:rPr lang="en-US" b="0" dirty="0"/>
+              <a:t>. The main tasks of the </a:t>
+            </a:r>
+            <a:r>
+              <a:rPr lang="en-US" b="0" dirty="0" err="1"/>
+              <a:t>MicroBlaze</a:t>
+            </a:r>
+            <a:r>
+              <a:rPr lang="en-US" b="0" dirty="0"/>
+              <a:t> will include</a:t>
+            </a:r>
+            <a:r>
+              <a:rPr lang="en-US" b="0" dirty="0" smtClean="0"/>
+              <a:t>: </a:t>
+            </a:r>
+          </a:p>
+          <a:p>
+            <a:pPr lvl="2"/>
+            <a:r>
+              <a:rPr lang="en-US" sz="2000" b="0" dirty="0" smtClean="0"/>
+              <a:t>Moving </a:t>
+            </a:r>
+            <a:r>
+              <a:rPr lang="en-US" sz="2000" b="0" dirty="0"/>
+              <a:t>audio samples into a pair of circular buffer. These circular buffers will be maintained in the address space of the </a:t>
+            </a:r>
+            <a:r>
+              <a:rPr lang="en-US" sz="2000" b="0" dirty="0" err="1"/>
+              <a:t>MicroBlaze</a:t>
+            </a:r>
+            <a:r>
+              <a:rPr lang="en-US" sz="2000" b="0" dirty="0"/>
+              <a:t>. That is you should have two big arrays defined in your program. Use polling of the ready bit of the flag register.</a:t>
+            </a:r>
+          </a:p>
+          <a:p>
+            <a:pPr lvl="2"/>
+            <a:r>
+              <a:rPr lang="en-US" sz="2000" b="0" dirty="0"/>
+              <a:t>Examining the samples looking for a trigger event.</a:t>
+            </a:r>
+          </a:p>
+          <a:p>
+            <a:pPr lvl="2"/>
+            <a:r>
+              <a:rPr lang="en-US" sz="2000" b="0" dirty="0"/>
+              <a:t>Fill the remaining sample slots in memory.</a:t>
             </a:r>
           </a:p>
           <a:p>
@@ -12327,53 +12388,7 @@
                 <a:spcPct val="80000"/>
               </a:lnSpc>
             </a:pPr>
-            <a:r>
-              <a:rPr lang="en-US" b="0" dirty="0" smtClean="0"/>
-              <a:t>??</a:t>
-            </a:r>
-            <a:endParaRPr lang="en-US" b="0" dirty="0"/>
-          </a:p>
-          <a:p>
-            <a:pPr eaLnBrk="1" hangingPunct="1">
-              <a:lnSpc>
-                <a:spcPct val="80000"/>
-              </a:lnSpc>
-            </a:pPr>
-            <a:r>
-              <a:rPr lang="en-US" dirty="0"/>
-              <a:t>Gate Check 1</a:t>
-            </a:r>
-          </a:p>
-          <a:p>
-            <a:pPr lvl="1" eaLnBrk="1" hangingPunct="1">
-              <a:lnSpc>
-                <a:spcPct val="80000"/>
-              </a:lnSpc>
-            </a:pPr>
-            <a:r>
-              <a:rPr lang="en-US" b="0" dirty="0"/>
-              <a:t>By </a:t>
-            </a:r>
-            <a:r>
-              <a:rPr lang="en-US" dirty="0"/>
-              <a:t>COB Lesson </a:t>
-            </a:r>
-            <a:r>
-              <a:rPr lang="en-US" dirty="0" smtClean="0"/>
-              <a:t>??</a:t>
-            </a:r>
-            <a:r>
-              <a:rPr lang="en-US" b="0" dirty="0" smtClean="0"/>
-              <a:t>, </a:t>
-            </a:r>
-            <a:r>
-              <a:rPr lang="en-US" b="0" dirty="0"/>
-              <a:t>you must </a:t>
-            </a:r>
-            <a:r>
-              <a:rPr lang="en-US" b="0" dirty="0" smtClean="0"/>
-              <a:t>have</a:t>
-            </a:r>
+            <a:endParaRPr lang="en-US" dirty="0"/>
           </a:p>
         </p:txBody>
       </p:sp>
@@ -12422,7 +12437,7 @@
     </p:spTree>
     <p:extLst>
       <p:ext uri="{BB962C8B-B14F-4D97-AF65-F5344CB8AC3E}">
-        <p14:creationId xmlns:p14="http://schemas.microsoft.com/office/powerpoint/2010/main" val="836955545"/>
+        <p14:creationId xmlns:p14="http://schemas.microsoft.com/office/powerpoint/2010/main" val="1292529013"/>
       </p:ext>
     </p:extLst>
   </p:cSld>
@@ -12480,7 +12495,15 @@
             </a:br>
             <a:r>
               <a:rPr lang="en-US" dirty="0" smtClean="0"/>
-              <a:t>Gate Check 2</a:t>
+              <a:t>Required Functionality </a:t>
+            </a:r>
+            <a:r>
+              <a:rPr lang="en-US" dirty="0" err="1" smtClean="0"/>
+              <a:t>Cont</a:t>
+            </a:r>
+            <a:r>
+              <a:rPr lang="en-US" dirty="0" smtClean="0"/>
+              <a:t> 1</a:t>
             </a:r>
             <a:endParaRPr lang="en-US" dirty="0"/>
           </a:p>
@@ -12501,53 +12524,32 @@
           <a:bodyPr/>
           <a:lstStyle/>
           <a:p>
-            <a:pPr eaLnBrk="1" hangingPunct="1">
-              <a:lnSpc>
-                <a:spcPct val="80000"/>
-              </a:lnSpc>
-            </a:pPr>
             <a:r>
               <a:rPr lang="en-US" dirty="0"/>
-              <a:t>Gate Check 2</a:t>
-            </a:r>
-          </a:p>
-          <a:p>
-            <a:pPr lvl="1" eaLnBrk="1" hangingPunct="1">
-              <a:lnSpc>
-                <a:spcPct val="80000"/>
-              </a:lnSpc>
-            </a:pPr>
-            <a:r>
-              <a:rPr lang="en-US" b="0" dirty="0" smtClean="0"/>
-              <a:t>By </a:t>
-            </a:r>
-            <a:r>
-              <a:rPr lang="en-US" dirty="0"/>
-              <a:t>BOC</a:t>
-            </a:r>
-            <a:r>
-              <a:rPr lang="en-US" b="0" dirty="0"/>
-              <a:t> </a:t>
-            </a:r>
-            <a:r>
-              <a:rPr lang="en-US" dirty="0"/>
-              <a:t>Lesson </a:t>
+              <a:t>Required </a:t>
             </a:r>
             <a:r>
               <a:rPr lang="en-US" dirty="0" smtClean="0"/>
-              <a:t>??</a:t>
-            </a:r>
-            <a:r>
-              <a:rPr lang="en-US" b="0" dirty="0" smtClean="0"/>
-              <a:t>, </a:t>
-            </a:r>
-            <a:r>
-              <a:rPr lang="en-US" b="0" dirty="0"/>
-              <a:t>you must </a:t>
-            </a:r>
-            <a:r>
-              <a:rPr lang="en-US" b="0" dirty="0" smtClean="0"/>
-              <a:t>have</a:t>
+              <a:t>Functionality </a:t>
+            </a:r>
+            <a:r>
+              <a:rPr lang="en-US" dirty="0" err="1" smtClean="0"/>
+              <a:t>cont</a:t>
+            </a:r>
+            <a:endParaRPr lang="en-US" dirty="0"/>
+          </a:p>
+          <a:p>
+            <a:pPr lvl="2"/>
+            <a:r>
+              <a:rPr lang="en-US" sz="2000" b="0" dirty="0"/>
+              <a:t>Move the appropriate buffer values into the display memory of the oscilloscope (lab2) component.</a:t>
+            </a:r>
+          </a:p>
+          <a:p>
+            <a:pPr lvl="2"/>
+            <a:r>
+              <a:rPr lang="en-US" sz="2000" b="0" dirty="0"/>
+              <a:t>Provide a user menu (through the terminal) allowing the user to adjust the trigger voltage and trigger time.</a:t>
             </a:r>
           </a:p>
         </p:txBody>
@@ -12597,7 +12599,7 @@
     </p:spTree>
     <p:extLst>
       <p:ext uri="{BB962C8B-B14F-4D97-AF65-F5344CB8AC3E}">
-        <p14:creationId xmlns:p14="http://schemas.microsoft.com/office/powerpoint/2010/main" val="2738895866"/>
+        <p14:creationId xmlns:p14="http://schemas.microsoft.com/office/powerpoint/2010/main" val="1382004493"/>
       </p:ext>
     </p:extLst>
   </p:cSld>
@@ -12655,7 +12657,7 @@
             </a:br>
             <a:r>
               <a:rPr lang="en-US" dirty="0" smtClean="0"/>
-              <a:t>Required Functionality</a:t>
+              <a:t>B-Level Functionality</a:t>
             </a:r>
             <a:endParaRPr lang="en-US" dirty="0"/>
           </a:p>
@@ -12677,77 +12679,40 @@
           <a:lstStyle/>
           <a:p>
             <a:r>
-              <a:rPr lang="en-US" dirty="0"/>
-              <a:t>Required Functionality</a:t>
-            </a:r>
+              <a:rPr lang="en-US" dirty="0" smtClean="0"/>
+              <a:t>B-level Functionality</a:t>
+            </a:r>
+            <a:endParaRPr lang="en-US" dirty="0"/>
           </a:p>
           <a:p>
             <a:pPr lvl="1"/>
             <a:r>
               <a:rPr lang="en-US" b="0" dirty="0"/>
-              <a:t>In order to make required functionality you will need to properly trigger the oscilloscope on channel 1 using a positive edge trigger. Control of this process is to be performed using the </a:t>
-            </a:r>
-            <a:r>
-              <a:rPr lang="en-US" b="0" dirty="0" err="1"/>
-              <a:t>MicroBlaze</a:t>
+              <a:t>Achieve required functionality</a:t>
+            </a:r>
+            <a:r>
+              <a:rPr lang="en-US" b="0" dirty="0" smtClean="0"/>
+              <a:t>.</a:t>
+            </a:r>
+          </a:p>
+          <a:p>
+            <a:pPr lvl="1"/>
+            <a:r>
+              <a:rPr lang="en-US" b="0" dirty="0" smtClean="0"/>
+              <a:t>Use </a:t>
             </a:r>
             <a:r>
               <a:rPr lang="en-US" b="0" dirty="0"/>
-              <a:t>. The main tasks of the </a:t>
-            </a:r>
-            <a:r>
-              <a:rPr lang="en-US" b="0" dirty="0" err="1"/>
-              <a:t>MicroBlaze</a:t>
+              <a:t>the ready bit of the flag register to trigger an interrupt. The ISR should store the samples (left and right), look for a triggering even, and signal when the stored samples should be </a:t>
+            </a:r>
+            <a:r>
+              <a:rPr lang="en-US" b="0" dirty="0" smtClean="0"/>
+              <a:t>transferred </a:t>
             </a:r>
             <a:r>
               <a:rPr lang="en-US" b="0" dirty="0"/>
-              <a:t> will include</a:t>
-            </a:r>
-            <a:r>
-              <a:rPr lang="en-US" b="0" dirty="0" smtClean="0"/>
-              <a:t>: </a:t>
-            </a:r>
-          </a:p>
-          <a:p>
-            <a:pPr lvl="2"/>
-            <a:r>
-              <a:rPr lang="en-US" sz="2000" b="0" dirty="0" smtClean="0"/>
-              <a:t>Moving </a:t>
-            </a:r>
-            <a:r>
-              <a:rPr lang="en-US" sz="2000" b="0" dirty="0"/>
-              <a:t>audio samples into a pair of circular buffer. These circular buffers will be maintained in the address space of the </a:t>
-            </a:r>
-            <a:r>
-              <a:rPr lang="en-US" sz="2000" b="0" dirty="0" err="1"/>
-              <a:t>MicroBlaze</a:t>
-            </a:r>
-            <a:r>
-              <a:rPr lang="en-US" sz="2000" b="0" dirty="0"/>
-              <a:t>. That is you should have two big arrays defined in your program. Use polling of the ready bit of the flag register.</a:t>
-            </a:r>
-          </a:p>
-          <a:p>
-            <a:pPr lvl="2"/>
-            <a:r>
-              <a:rPr lang="en-US" sz="2000" b="0" dirty="0"/>
-              <a:t>Examining the samples looking for a trigger event.</a:t>
-            </a:r>
-          </a:p>
-          <a:p>
-            <a:pPr lvl="2"/>
-            <a:r>
-              <a:rPr lang="en-US" sz="2000" b="0" dirty="0"/>
-              <a:t>Fill the remaining sample slots in memory.</a:t>
-            </a:r>
-          </a:p>
-          <a:p>
-            <a:pPr lvl="1" eaLnBrk="1" hangingPunct="1">
-              <a:lnSpc>
-                <a:spcPct val="80000"/>
-              </a:lnSpc>
-            </a:pPr>
-            <a:endParaRPr lang="en-US" dirty="0"/>
+              <a:t>to the BRAM in the oscilloscope component.</a:t>
+            </a:r>
           </a:p>
         </p:txBody>
       </p:sp>
@@ -12796,7 +12761,7 @@
     </p:spTree>
     <p:extLst>
       <p:ext uri="{BB962C8B-B14F-4D97-AF65-F5344CB8AC3E}">
-        <p14:creationId xmlns:p14="http://schemas.microsoft.com/office/powerpoint/2010/main" val="1292529013"/>
+        <p14:creationId xmlns:p14="http://schemas.microsoft.com/office/powerpoint/2010/main" val="363392082"/>
       </p:ext>
     </p:extLst>
   </p:cSld>
@@ -12854,15 +12819,7 @@
             </a:br>
             <a:r>
               <a:rPr lang="en-US" dirty="0" smtClean="0"/>
-              <a:t>Required Functionality </a:t>
-            </a:r>
-            <a:r>
-              <a:rPr lang="en-US" dirty="0" err="1" smtClean="0"/>
-              <a:t>Cont</a:t>
-            </a:r>
-            <a:r>
-              <a:rPr lang="en-US" dirty="0" smtClean="0"/>
-              <a:t> 1</a:t>
+              <a:t>A-Level Functionality</a:t>
             </a:r>
             <a:endParaRPr lang="en-US" dirty="0"/>
           </a:p>
@@ -12885,31 +12842,50 @@
           <a:p>
             <a:r>
               <a:rPr lang="en-US" dirty="0"/>
-              <a:t>Required </a:t>
+              <a:t>A-level </a:t>
             </a:r>
             <a:r>
               <a:rPr lang="en-US" dirty="0" smtClean="0"/>
-              <a:t>Functionality </a:t>
-            </a:r>
-            <a:r>
-              <a:rPr lang="en-US" dirty="0" err="1" smtClean="0"/>
-              <a:t>cont</a:t>
+              <a:t>Functionality</a:t>
             </a:r>
             <a:endParaRPr lang="en-US" dirty="0"/>
           </a:p>
           <a:p>
-            <a:pPr lvl="2"/>
-            <a:r>
-              <a:rPr lang="en-US" sz="2000" b="0" dirty="0"/>
-              <a:t>Move the appropriate buffer values into the display memory of the oscilloscope (lab2) component.</a:t>
-            </a:r>
-          </a:p>
-          <a:p>
-            <a:pPr lvl="2"/>
-            <a:r>
-              <a:rPr lang="en-US" sz="2000" b="0" dirty="0"/>
-              <a:t>Provide a user menu (through the terminal) allowing the user to adjust the trigger voltage and trigger time.</a:t>
-            </a:r>
+            <a:pPr lvl="1"/>
+            <a:r>
+              <a:rPr lang="en-US" b="0" dirty="0"/>
+              <a:t>Achieve B-level functionality</a:t>
+            </a:r>
+            <a:r>
+              <a:rPr lang="en-US" b="0" dirty="0" smtClean="0"/>
+              <a:t>. Ability </a:t>
+            </a:r>
+            <a:r>
+              <a:rPr lang="en-US" b="0" dirty="0"/>
+              <a:t>to enable and disable channels to display</a:t>
+            </a:r>
+          </a:p>
+          <a:p>
+            <a:pPr lvl="1"/>
+            <a:r>
+              <a:rPr lang="en-US" b="0" dirty="0"/>
+              <a:t>Ability to trigger off channel 2</a:t>
+            </a:r>
+          </a:p>
+          <a:p>
+            <a:pPr lvl="1"/>
+            <a:r>
+              <a:rPr lang="en-US" b="0" dirty="0"/>
+              <a:t>Ability to change the slope direction for the trigger.</a:t>
+            </a:r>
+          </a:p>
+          <a:p>
+            <a:pPr lvl="2" eaLnBrk="1" hangingPunct="1">
+              <a:lnSpc>
+                <a:spcPct val="80000"/>
+              </a:lnSpc>
+            </a:pPr>
+            <a:endParaRPr lang="en-US" dirty="0"/>
           </a:p>
         </p:txBody>
       </p:sp>
@@ -12958,7 +12934,7 @@
     </p:spTree>
     <p:extLst>
       <p:ext uri="{BB962C8B-B14F-4D97-AF65-F5344CB8AC3E}">
-        <p14:creationId xmlns:p14="http://schemas.microsoft.com/office/powerpoint/2010/main" val="1382004493"/>
+        <p14:creationId xmlns:p14="http://schemas.microsoft.com/office/powerpoint/2010/main" val="517968935"/>
       </p:ext>
     </p:extLst>
   </p:cSld>
@@ -13016,7 +12992,7 @@
             </a:br>
             <a:r>
               <a:rPr lang="en-US" dirty="0" smtClean="0"/>
-              <a:t>B-Level Functionality</a:t>
+              <a:t>Turn In</a:t>
             </a:r>
             <a:endParaRPr lang="en-US" dirty="0"/>
           </a:p>
@@ -13039,7 +13015,7 @@
           <a:p>
             <a:r>
               <a:rPr lang="en-US" dirty="0" smtClean="0"/>
-              <a:t>B-level Functionality</a:t>
+              <a:t>Turn In Requirements</a:t>
             </a:r>
             <a:endParaRPr lang="en-US" dirty="0"/>
           </a:p>
@@ -13047,31 +13023,21 @@
             <a:pPr lvl="1"/>
             <a:r>
               <a:rPr lang="en-US" b="0" dirty="0"/>
-              <a:t>Achieve required functionality</a:t>
+              <a:t>All your work in this lab is to be submitted using </a:t>
+            </a:r>
+            <a:r>
+              <a:rPr lang="en-US" b="0" dirty="0" err="1"/>
+              <a:t>Bitbucket</a:t>
+            </a:r>
+            <a:r>
+              <a:rPr lang="en-US" b="0" dirty="0"/>
+              <a:t>. The main part of the lab is your README, documenting your design</a:t>
             </a:r>
             <a:r>
               <a:rPr lang="en-US" b="0" dirty="0" smtClean="0"/>
               <a:t>.</a:t>
             </a:r>
-          </a:p>
-          <a:p>
-            <a:pPr lvl="1"/>
-            <a:r>
-              <a:rPr lang="en-US" b="0" dirty="0" smtClean="0"/>
-              <a:t>Use </a:t>
-            </a:r>
-            <a:r>
-              <a:rPr lang="en-US" b="0" dirty="0"/>
-              <a:t>the ready bit of the flag register to trigger an interrupt. The ISR should store the samples (left and right), look for a triggering even, and signal when the stored samples should be </a:t>
-            </a:r>
-            <a:r>
-              <a:rPr lang="en-US" b="0" dirty="0" smtClean="0"/>
-              <a:t>transferred </a:t>
-            </a:r>
-            <a:r>
-              <a:rPr lang="en-US" b="0" dirty="0"/>
-              <a:t>to the BRAM in the oscilloscope component.</a:t>
-            </a:r>
+            <a:endParaRPr lang="en-US" b="0" dirty="0"/>
           </a:p>
         </p:txBody>
       </p:sp>
@@ -13108,331 +13074,6 @@
                 <a:defRPr/>
               </a:pPr>
               <a:t>17</a:t>
-            </a:fld>
-            <a:endParaRPr lang="en-US" dirty="0">
-              <a:solidFill>
-                <a:srgbClr val="000000"/>
-              </a:solidFill>
-            </a:endParaRPr>
-          </a:p>
-        </p:txBody>
-      </p:sp>
-    </p:spTree>
-    <p:extLst>
-      <p:ext uri="{BB962C8B-B14F-4D97-AF65-F5344CB8AC3E}">
-        <p14:creationId xmlns:p14="http://schemas.microsoft.com/office/powerpoint/2010/main" val="363392082"/>
-      </p:ext>
-    </p:extLst>
-  </p:cSld>
-  <p:clrMapOvr>
-    <a:masterClrMapping/>
-  </p:clrMapOvr>
-  <p:timing>
-    <p:tnLst>
-      <p:par>
-        <p:cTn id="1" dur="indefinite" restart="never" nodeType="tmRoot"/>
-      </p:par>
-    </p:tnLst>
-  </p:timing>
-</p:sld>
-</file>
-
-<file path=ppt/slides/slide18.xml><?xml version="1.0" encoding="utf-8"?>
-<p:sld xmlns:a="http://schemas.openxmlformats.org/drawingml/2006/main" xmlns:r="http://schemas.openxmlformats.org/officeDocument/2006/relationships" xmlns:p="http://schemas.openxmlformats.org/presentationml/2006/main">
-  <p:cSld>
-    <p:spTree>
-      <p:nvGrpSpPr>
-        <p:cNvPr id="1" name=""/>
-        <p:cNvGrpSpPr/>
-        <p:nvPr/>
-      </p:nvGrpSpPr>
-      <p:grpSpPr>
-        <a:xfrm>
-          <a:off x="0" y="0"/>
-          <a:ext cx="0" cy="0"/>
-          <a:chOff x="0" y="0"/>
-          <a:chExt cx="0" cy="0"/>
-        </a:xfrm>
-      </p:grpSpPr>
-      <p:sp>
-        <p:nvSpPr>
-          <p:cNvPr id="2" name="Title 1"/>
-          <p:cNvSpPr>
-            <a:spLocks noGrp="1"/>
-          </p:cNvSpPr>
-          <p:nvPr>
-            <p:ph type="title"/>
-          </p:nvPr>
-        </p:nvSpPr>
-        <p:spPr/>
-        <p:txBody>
-          <a:bodyPr/>
-          <a:lstStyle/>
-          <a:p>
-            <a:r>
-              <a:rPr lang="en-US" dirty="0" smtClean="0"/>
-              <a:t>Lab 3 – Requirements</a:t>
-            </a:r>
-            <a:br>
-              <a:rPr lang="en-US" dirty="0" smtClean="0"/>
-            </a:br>
-            <a:r>
-              <a:rPr lang="en-US" dirty="0" smtClean="0"/>
-              <a:t>A-Level Functionality</a:t>
-            </a:r>
-            <a:endParaRPr lang="en-US" dirty="0"/>
-          </a:p>
-        </p:txBody>
-      </p:sp>
-      <p:sp>
-        <p:nvSpPr>
-          <p:cNvPr id="4" name="Content Placeholder 3"/>
-          <p:cNvSpPr>
-            <a:spLocks noGrp="1"/>
-          </p:cNvSpPr>
-          <p:nvPr>
-            <p:ph idx="1"/>
-          </p:nvPr>
-        </p:nvSpPr>
-        <p:spPr/>
-        <p:txBody>
-          <a:bodyPr/>
-          <a:lstStyle/>
-          <a:p>
-            <a:r>
-              <a:rPr lang="en-US" dirty="0"/>
-              <a:t>A-level </a:t>
-            </a:r>
-            <a:r>
-              <a:rPr lang="en-US" dirty="0" smtClean="0"/>
-              <a:t>Functionality</a:t>
-            </a:r>
-            <a:endParaRPr lang="en-US" dirty="0"/>
-          </a:p>
-          <a:p>
-            <a:pPr lvl="1"/>
-            <a:r>
-              <a:rPr lang="en-US" b="0" dirty="0"/>
-              <a:t>Achieve B-level functionality</a:t>
-            </a:r>
-            <a:r>
-              <a:rPr lang="en-US" b="0" dirty="0" smtClean="0"/>
-              <a:t>. Ability </a:t>
-            </a:r>
-            <a:r>
-              <a:rPr lang="en-US" b="0" dirty="0"/>
-              <a:t>to enable and disable channels to display</a:t>
-            </a:r>
-          </a:p>
-          <a:p>
-            <a:pPr lvl="1"/>
-            <a:r>
-              <a:rPr lang="en-US" b="0" dirty="0"/>
-              <a:t>Ability to trigger off channel 2</a:t>
-            </a:r>
-          </a:p>
-          <a:p>
-            <a:pPr lvl="1"/>
-            <a:r>
-              <a:rPr lang="en-US" b="0" dirty="0"/>
-              <a:t>Ability to change the slope direction for the trigger.</a:t>
-            </a:r>
-          </a:p>
-          <a:p>
-            <a:pPr lvl="2" eaLnBrk="1" hangingPunct="1">
-              <a:lnSpc>
-                <a:spcPct val="80000"/>
-              </a:lnSpc>
-            </a:pPr>
-            <a:endParaRPr lang="en-US" dirty="0"/>
-          </a:p>
-        </p:txBody>
-      </p:sp>
-      <p:sp>
-        <p:nvSpPr>
-          <p:cNvPr id="6" name="Slide Number Placeholder 3"/>
-          <p:cNvSpPr>
-            <a:spLocks noGrp="1"/>
-          </p:cNvSpPr>
-          <p:nvPr>
-            <p:ph type="sldNum" sz="quarter" idx="10"/>
-          </p:nvPr>
-        </p:nvSpPr>
-        <p:spPr>
-          <a:xfrm>
-            <a:off x="6942160" y="6381750"/>
-            <a:ext cx="2133600" cy="476250"/>
-          </a:xfrm>
-        </p:spPr>
-        <p:txBody>
-          <a:bodyPr/>
-          <a:lstStyle/>
-          <a:p>
-            <a:pPr>
-              <a:defRPr/>
-            </a:pPr>
-            <a:fld id="{62D6D4B2-7611-498F-8780-1EDC26277454}" type="slidenum">
-              <a:rPr lang="en-US" smtClean="0">
-                <a:solidFill>
-                  <a:srgbClr val="000000"/>
-                </a:solidFill>
-              </a:rPr>
-              <a:pPr>
-                <a:defRPr/>
-              </a:pPr>
-              <a:t>18</a:t>
-            </a:fld>
-            <a:endParaRPr lang="en-US" dirty="0">
-              <a:solidFill>
-                <a:srgbClr val="000000"/>
-              </a:solidFill>
-            </a:endParaRPr>
-          </a:p>
-        </p:txBody>
-      </p:sp>
-    </p:spTree>
-    <p:extLst>
-      <p:ext uri="{BB962C8B-B14F-4D97-AF65-F5344CB8AC3E}">
-        <p14:creationId xmlns:p14="http://schemas.microsoft.com/office/powerpoint/2010/main" val="517968935"/>
-      </p:ext>
-    </p:extLst>
-  </p:cSld>
-  <p:clrMapOvr>
-    <a:masterClrMapping/>
-  </p:clrMapOvr>
-  <p:timing>
-    <p:tnLst>
-      <p:par>
-        <p:cTn id="1" dur="indefinite" restart="never" nodeType="tmRoot"/>
-      </p:par>
-    </p:tnLst>
-  </p:timing>
-</p:sld>
-</file>
-
-<file path=ppt/slides/slide19.xml><?xml version="1.0" encoding="utf-8"?>
-<p:sld xmlns:a="http://schemas.openxmlformats.org/drawingml/2006/main" xmlns:r="http://schemas.openxmlformats.org/officeDocument/2006/relationships" xmlns:p="http://schemas.openxmlformats.org/presentationml/2006/main">
-  <p:cSld>
-    <p:spTree>
-      <p:nvGrpSpPr>
-        <p:cNvPr id="1" name=""/>
-        <p:cNvGrpSpPr/>
-        <p:nvPr/>
-      </p:nvGrpSpPr>
-      <p:grpSpPr>
-        <a:xfrm>
-          <a:off x="0" y="0"/>
-          <a:ext cx="0" cy="0"/>
-          <a:chOff x="0" y="0"/>
-          <a:chExt cx="0" cy="0"/>
-        </a:xfrm>
-      </p:grpSpPr>
-      <p:sp>
-        <p:nvSpPr>
-          <p:cNvPr id="2" name="Title 1"/>
-          <p:cNvSpPr>
-            <a:spLocks noGrp="1"/>
-          </p:cNvSpPr>
-          <p:nvPr>
-            <p:ph type="title"/>
-          </p:nvPr>
-        </p:nvSpPr>
-        <p:spPr/>
-        <p:txBody>
-          <a:bodyPr/>
-          <a:lstStyle/>
-          <a:p>
-            <a:r>
-              <a:rPr lang="en-US" dirty="0" smtClean="0"/>
-              <a:t>Lab 3 – Requirements</a:t>
-            </a:r>
-            <a:br>
-              <a:rPr lang="en-US" dirty="0" smtClean="0"/>
-            </a:br>
-            <a:r>
-              <a:rPr lang="en-US" dirty="0" smtClean="0"/>
-              <a:t>Turn In</a:t>
-            </a:r>
-            <a:endParaRPr lang="en-US" dirty="0"/>
-          </a:p>
-        </p:txBody>
-      </p:sp>
-      <p:sp>
-        <p:nvSpPr>
-          <p:cNvPr id="4" name="Content Placeholder 3"/>
-          <p:cNvSpPr>
-            <a:spLocks noGrp="1"/>
-          </p:cNvSpPr>
-          <p:nvPr>
-            <p:ph idx="1"/>
-          </p:nvPr>
-        </p:nvSpPr>
-        <p:spPr/>
-        <p:txBody>
-          <a:bodyPr/>
-          <a:lstStyle/>
-          <a:p>
-            <a:r>
-              <a:rPr lang="en-US" dirty="0" smtClean="0"/>
-              <a:t>Turn In Requirements</a:t>
-            </a:r>
-            <a:endParaRPr lang="en-US" dirty="0"/>
-          </a:p>
-          <a:p>
-            <a:pPr lvl="1"/>
-            <a:r>
-              <a:rPr lang="en-US" b="0" dirty="0"/>
-              <a:t>All your work in this lab is to be submitted using </a:t>
-            </a:r>
-            <a:r>
-              <a:rPr lang="en-US" b="0" dirty="0" err="1"/>
-              <a:t>Bitbucket</a:t>
-            </a:r>
-            <a:r>
-              <a:rPr lang="en-US" b="0" dirty="0"/>
-              <a:t>. The main part of the lab is your README, documenting your design</a:t>
-            </a:r>
-            <a:r>
-              <a:rPr lang="en-US" b="0" dirty="0" smtClean="0"/>
-              <a:t>.</a:t>
-            </a:r>
-            <a:endParaRPr lang="en-US" b="0" dirty="0"/>
-          </a:p>
-        </p:txBody>
-      </p:sp>
-      <p:sp>
-        <p:nvSpPr>
-          <p:cNvPr id="6" name="Slide Number Placeholder 3"/>
-          <p:cNvSpPr>
-            <a:spLocks noGrp="1"/>
-          </p:cNvSpPr>
-          <p:nvPr>
-            <p:ph type="sldNum" sz="quarter" idx="10"/>
-          </p:nvPr>
-        </p:nvSpPr>
-        <p:spPr>
-          <a:xfrm>
-            <a:off x="6942160" y="6381750"/>
-            <a:ext cx="2133600" cy="476250"/>
-          </a:xfrm>
-        </p:spPr>
-        <p:txBody>
-          <a:bodyPr/>
-          <a:lstStyle/>
-          <a:p>
-            <a:pPr>
-              <a:defRPr/>
-            </a:pPr>
-            <a:fld id="{62D6D4B2-7611-498F-8780-1EDC26277454}" type="slidenum">
-              <a:rPr lang="en-US" smtClean="0">
-                <a:solidFill>
-                  <a:srgbClr val="000000"/>
-                </a:solidFill>
-              </a:rPr>
-              <a:pPr>
-                <a:defRPr/>
-              </a:pPr>
-              <a:t>19</a:t>
             </a:fld>
             <a:endParaRPr lang="en-US" dirty="0">
               <a:solidFill>
@@ -13834,7 +13475,15 @@
             </a:r>
             <a:r>
               <a:rPr lang="en-US" b="0" dirty="0"/>
-              <a:t>In this lab we will integrate the video display controller developed in Lab 2 with the </a:t>
+              <a:t>In this </a:t>
+            </a:r>
+            <a:r>
+              <a:rPr lang="en-US" b="0" dirty="0" smtClean="0"/>
+              <a:t>lab, </a:t>
+            </a:r>
+            <a:r>
+              <a:rPr lang="en-US" b="0" dirty="0"/>
+              <a:t>we will integrate the video display controller developed in Lab 2 with the </a:t>
             </a:r>
             <a:r>
               <a:rPr lang="en-US" b="0" dirty="0" err="1" smtClean="0"/>
@@ -13846,7 +13495,31 @@
             </a:r>
             <a:r>
               <a:rPr lang="en-US" b="0" dirty="0"/>
-              <a:t>processor built using the fabric of the FPGA. In the preceding lecture we have learned about the EDK and SDK tool chains, now its time to put that knowledge to the test by building a software controlled </a:t>
+              <a:t>processor built using the fabric of the </a:t>
+            </a:r>
+            <a:r>
+              <a:rPr lang="en-US" b="0" dirty="0" smtClean="0"/>
+              <a:t>Artix-7 FPGA</a:t>
+            </a:r>
+            <a:r>
+              <a:rPr lang="en-US" b="0" dirty="0"/>
+              <a:t>. In the preceding </a:t>
+            </a:r>
+            <a:r>
+              <a:rPr lang="en-US" b="0" dirty="0" smtClean="0"/>
+              <a:t>lectures, </a:t>
+            </a:r>
+            <a:r>
+              <a:rPr lang="en-US" b="0" dirty="0"/>
+              <a:t>we have learned about the EDK and SDK tool </a:t>
+            </a:r>
+            <a:r>
+              <a:rPr lang="en-US" b="0" dirty="0" smtClean="0"/>
+              <a:t>chains. Now, it’s </a:t>
+            </a:r>
+            <a:r>
+              <a:rPr lang="en-US" b="0" dirty="0"/>
+              <a:t>time to put that knowledge to the test by building a software controlled </a:t>
             </a:r>
             <a:r>
               <a:rPr lang="en-US" b="0" dirty="0" err="1"/>

</xml_diff>